<commit_message>
Update project documentation and manuals for Sistema de Gestión de Horarios (SGH)
</commit_message>
<xml_diff>
--- a/00-Presentacion_Del_Equipo_SGH.pptx
+++ b/00-Presentacion_Del_Equipo_SGH.pptx
@@ -2,16 +2,14 @@
 <file path=ppt/presentation.xml><?xml version="1.0" encoding="utf-8"?>
 <p:presentation xmlns:a="http://schemas.openxmlformats.org/drawingml/2006/main" xmlns:r="http://schemas.openxmlformats.org/officeDocument/2006/relationships" xmlns:p="http://schemas.openxmlformats.org/presentationml/2006/main">
   <p:sldMasterIdLst>
-    <p:sldMasterId id="2147483648" r:id="rId1"/>
+    <p:sldMasterId id="2147483648" r:id="rId4"/>
   </p:sldMasterIdLst>
   <p:sldIdLst>
-    <p:sldId id="256" r:id="rId2"/>
-    <p:sldId id="258" r:id="rId3"/>
-    <p:sldId id="259" r:id="rId4"/>
-    <p:sldId id="260" r:id="rId5"/>
-    <p:sldId id="257" r:id="rId6"/>
-    <p:sldId id="263" r:id="rId7"/>
-    <p:sldId id="264" r:id="rId8"/>
+    <p:sldId id="256" r:id="rId5"/>
+    <p:sldId id="259" r:id="rId6"/>
+    <p:sldId id="260" r:id="rId7"/>
+    <p:sldId id="257" r:id="rId8"/>
+    <p:sldId id="263" r:id="rId9"/>
   </p:sldIdLst>
   <p:sldSz cx="9144000" cy="5168900"/>
   <p:notesSz cx="9144000" cy="5168900"/>
@@ -4501,7 +4499,7 @@
           <a:p>
             <a:fld id="{1D8BD707-D9CF-40AE-B4C6-C98DA3205C09}" type="datetimeFigureOut">
               <a:rPr lang="en-US"/>
-              <a:t>10/8/2025</a:t>
+              <a:t>11/15/2025</a:t>
             </a:fld>
             <a:endParaRPr lang="en-US"/>
           </a:p>
@@ -4676,7 +4674,7 @@
           <a:p>
             <a:fld id="{1D8BD707-D9CF-40AE-B4C6-C98DA3205C09}" type="datetimeFigureOut">
               <a:rPr lang="en-US"/>
-              <a:t>10/8/2025</a:t>
+              <a:t>11/15/2025</a:t>
             </a:fld>
             <a:endParaRPr lang="en-US"/>
           </a:p>
@@ -4890,7 +4888,7 @@
           <a:p>
             <a:fld id="{1D8BD707-D9CF-40AE-B4C6-C98DA3205C09}" type="datetimeFigureOut">
               <a:rPr lang="en-US"/>
-              <a:t>10/8/2025</a:t>
+              <a:t>11/15/2025</a:t>
             </a:fld>
             <a:endParaRPr lang="en-US"/>
           </a:p>
@@ -5038,7 +5036,7 @@
           <a:p>
             <a:fld id="{1D8BD707-D9CF-40AE-B4C6-C98DA3205C09}" type="datetimeFigureOut">
               <a:rPr lang="en-US"/>
-              <a:t>10/8/2025</a:t>
+              <a:t>11/15/2025</a:t>
             </a:fld>
             <a:endParaRPr lang="en-US"/>
           </a:p>
@@ -5157,7 +5155,7 @@
           <a:p>
             <a:fld id="{1D8BD707-D9CF-40AE-B4C6-C98DA3205C09}" type="datetimeFigureOut">
               <a:rPr lang="en-US"/>
-              <a:t>10/8/2025</a:t>
+              <a:t>11/15/2025</a:t>
             </a:fld>
             <a:endParaRPr lang="en-US"/>
           </a:p>
@@ -5607,7 +5605,7 @@
           <a:p>
             <a:fld id="{1D8BD707-D9CF-40AE-B4C6-C98DA3205C09}" type="datetimeFigureOut">
               <a:rPr lang="en-US"/>
-              <a:t>10/8/2025</a:t>
+              <a:t>11/15/2025</a:t>
             </a:fld>
             <a:endParaRPr lang="en-US"/>
           </a:p>
@@ -6124,1470 +6122,6 @@
         </p:nvSpPr>
         <p:spPr>
           <a:xfrm>
-            <a:off x="1412494" y="1271904"/>
-            <a:ext cx="1347470" cy="673100"/>
-          </a:xfrm>
-          <a:prstGeom prst="rect">
-            <a:avLst/>
-          </a:prstGeom>
-        </p:spPr>
-        <p:txBody>
-          <a:bodyPr vert="horz" wrap="square" lIns="0" tIns="139065" rIns="0" bIns="0" rtlCol="0">
-            <a:spAutoFit/>
-          </a:bodyPr>
-          <a:lstStyle/>
-          <a:p>
-            <a:pPr marL="12700">
-              <a:lnSpc>
-                <a:spcPct val="100000"/>
-              </a:lnSpc>
-              <a:spcBef>
-                <a:spcPts val="1095"/>
-              </a:spcBef>
-            </a:pPr>
-            <a:r>
-              <a:rPr sz="1600" b="1" spc="-10" dirty="0">
-                <a:solidFill>
-                  <a:srgbClr val="202020"/>
-                </a:solidFill>
-                <a:latin typeface="Arial"/>
-                <a:cs typeface="Arial"/>
-              </a:rPr>
-              <a:t>Backend</a:t>
-            </a:r>
-            <a:endParaRPr sz="1600">
-              <a:latin typeface="Arial"/>
-              <a:cs typeface="Arial"/>
-            </a:endParaRPr>
-          </a:p>
-          <a:p>
-            <a:pPr marL="12700">
-              <a:lnSpc>
-                <a:spcPct val="100000"/>
-              </a:lnSpc>
-              <a:spcBef>
-                <a:spcPts val="740"/>
-              </a:spcBef>
-            </a:pPr>
-            <a:r>
-              <a:rPr sz="1200" dirty="0">
-                <a:solidFill>
-                  <a:srgbClr val="202020"/>
-                </a:solidFill>
-                <a:latin typeface="Tahoma"/>
-                <a:cs typeface="Tahoma"/>
-              </a:rPr>
-              <a:t>Desarrollo</a:t>
-            </a:r>
-            <a:r>
-              <a:rPr sz="1200" spc="200" dirty="0">
-                <a:solidFill>
-                  <a:srgbClr val="202020"/>
-                </a:solidFill>
-                <a:latin typeface="Tahoma"/>
-                <a:cs typeface="Tahoma"/>
-              </a:rPr>
-              <a:t> </a:t>
-            </a:r>
-            <a:r>
-              <a:rPr sz="1200" spc="-10" dirty="0">
-                <a:solidFill>
-                  <a:srgbClr val="202020"/>
-                </a:solidFill>
-                <a:latin typeface="Tahoma"/>
-                <a:cs typeface="Tahoma"/>
-              </a:rPr>
-              <a:t>Backend</a:t>
-            </a:r>
-            <a:endParaRPr sz="1200">
-              <a:latin typeface="Tahoma"/>
-              <a:cs typeface="Tahoma"/>
-            </a:endParaRPr>
-          </a:p>
-        </p:txBody>
-      </p:sp>
-      <p:sp>
-        <p:nvSpPr>
-          <p:cNvPr id="4" name="object 4"/>
-          <p:cNvSpPr/>
-          <p:nvPr/>
-        </p:nvSpPr>
-        <p:spPr>
-          <a:xfrm>
-            <a:off x="3465576" y="1179575"/>
-            <a:ext cx="2057400" cy="3115310"/>
-          </a:xfrm>
-          <a:custGeom>
-            <a:avLst/>
-            <a:gdLst/>
-            <a:ahLst/>
-            <a:cxnLst/>
-            <a:rect l="l" t="t" r="r" b="b"/>
-            <a:pathLst>
-              <a:path w="2057400" h="3115310">
-                <a:moveTo>
-                  <a:pt x="2057400" y="0"/>
-                </a:moveTo>
-                <a:lnTo>
-                  <a:pt x="0" y="0"/>
-                </a:lnTo>
-                <a:lnTo>
-                  <a:pt x="0" y="3114929"/>
-                </a:lnTo>
-                <a:lnTo>
-                  <a:pt x="2057400" y="3114929"/>
-                </a:lnTo>
-                <a:lnTo>
-                  <a:pt x="2057400" y="0"/>
-                </a:lnTo>
-                <a:close/>
-              </a:path>
-            </a:pathLst>
-          </a:custGeom>
-          <a:solidFill>
-            <a:srgbClr val="515244"/>
-          </a:solidFill>
-        </p:spPr>
-        <p:txBody>
-          <a:bodyPr wrap="square" lIns="0" tIns="0" rIns="0" bIns="0" rtlCol="0"/>
-          <a:lstStyle/>
-          <a:p>
-            <a:endParaRPr/>
-          </a:p>
-        </p:txBody>
-      </p:sp>
-      <p:sp>
-        <p:nvSpPr>
-          <p:cNvPr id="5" name="object 5"/>
-          <p:cNvSpPr txBox="1"/>
-          <p:nvPr/>
-        </p:nvSpPr>
-        <p:spPr>
-          <a:xfrm>
-            <a:off x="3904488" y="3755135"/>
-            <a:ext cx="1179830" cy="344325"/>
-          </a:xfrm>
-          <a:prstGeom prst="rect">
-            <a:avLst/>
-          </a:prstGeom>
-          <a:solidFill>
-            <a:srgbClr val="9DA879"/>
-          </a:solidFill>
-        </p:spPr>
-        <p:txBody>
-          <a:bodyPr vert="horz" wrap="square" lIns="0" tIns="36195" rIns="0" bIns="0" rtlCol="0">
-            <a:spAutoFit/>
-          </a:bodyPr>
-          <a:lstStyle/>
-          <a:p>
-            <a:pPr marL="330200" marR="155575" indent="-155575">
-              <a:lnSpc>
-                <a:spcPct val="100000"/>
-              </a:lnSpc>
-              <a:spcBef>
-                <a:spcPts val="285"/>
-              </a:spcBef>
-            </a:pPr>
-            <a:r>
-              <a:rPr sz="1000" b="1" spc="-10" dirty="0">
-                <a:solidFill>
-                  <a:srgbClr val="202020"/>
-                </a:solidFill>
-                <a:latin typeface="Tahoma"/>
-                <a:cs typeface="Tahoma"/>
-              </a:rPr>
-              <a:t>Martin</a:t>
-            </a:r>
-            <a:r>
-              <a:rPr lang="es-ES" sz="1000" b="1" spc="-10" dirty="0">
-                <a:solidFill>
-                  <a:srgbClr val="202020"/>
-                </a:solidFill>
-                <a:latin typeface="Tahoma"/>
-                <a:cs typeface="Tahoma"/>
-              </a:rPr>
-              <a:t> </a:t>
-            </a:r>
-            <a:r>
-              <a:rPr sz="1000" b="1" spc="-10" dirty="0" err="1">
-                <a:solidFill>
-                  <a:srgbClr val="202020"/>
-                </a:solidFill>
-                <a:latin typeface="Tahoma"/>
-                <a:cs typeface="Tahoma"/>
-              </a:rPr>
-              <a:t>Stiben</a:t>
-            </a:r>
-            <a:r>
-              <a:rPr sz="1000" b="1" spc="-10" dirty="0">
-                <a:solidFill>
-                  <a:srgbClr val="202020"/>
-                </a:solidFill>
-                <a:latin typeface="Tahoma"/>
-                <a:cs typeface="Tahoma"/>
-              </a:rPr>
-              <a:t> Narváez</a:t>
-            </a:r>
-            <a:endParaRPr sz="1000" dirty="0">
-              <a:latin typeface="Tahoma"/>
-              <a:cs typeface="Tahoma"/>
-            </a:endParaRPr>
-          </a:p>
-        </p:txBody>
-      </p:sp>
-      <p:grpSp>
-        <p:nvGrpSpPr>
-          <p:cNvPr id="7" name="object 7"/>
-          <p:cNvGrpSpPr/>
-          <p:nvPr/>
-        </p:nvGrpSpPr>
-        <p:grpSpPr>
-          <a:xfrm>
-            <a:off x="780287" y="1417319"/>
-            <a:ext cx="542290" cy="542290"/>
-            <a:chOff x="780287" y="1417319"/>
-            <a:chExt cx="542290" cy="542290"/>
-          </a:xfrm>
-        </p:grpSpPr>
-        <p:sp>
-          <p:nvSpPr>
-            <p:cNvPr id="8" name="object 8"/>
-            <p:cNvSpPr/>
-            <p:nvPr/>
-          </p:nvSpPr>
-          <p:spPr>
-            <a:xfrm>
-              <a:off x="780287" y="1417319"/>
-              <a:ext cx="542290" cy="542290"/>
-            </a:xfrm>
-            <a:custGeom>
-              <a:avLst/>
-              <a:gdLst/>
-              <a:ahLst/>
-              <a:cxnLst/>
-              <a:rect l="l" t="t" r="r" b="b"/>
-              <a:pathLst>
-                <a:path w="542290" h="542289">
-                  <a:moveTo>
-                    <a:pt x="542036" y="0"/>
-                  </a:moveTo>
-                  <a:lnTo>
-                    <a:pt x="0" y="0"/>
-                  </a:lnTo>
-                  <a:lnTo>
-                    <a:pt x="0" y="542035"/>
-                  </a:lnTo>
-                  <a:lnTo>
-                    <a:pt x="542036" y="542035"/>
-                  </a:lnTo>
-                  <a:lnTo>
-                    <a:pt x="542036" y="0"/>
-                  </a:lnTo>
-                  <a:close/>
-                </a:path>
-              </a:pathLst>
-            </a:custGeom>
-            <a:solidFill>
-              <a:srgbClr val="515244"/>
-            </a:solidFill>
-          </p:spPr>
-          <p:txBody>
-            <a:bodyPr wrap="square" lIns="0" tIns="0" rIns="0" bIns="0" rtlCol="0"/>
-            <a:lstStyle/>
-            <a:p>
-              <a:endParaRPr/>
-            </a:p>
-          </p:txBody>
-        </p:sp>
-        <p:sp>
-          <p:nvSpPr>
-            <p:cNvPr id="9" name="object 9"/>
-            <p:cNvSpPr/>
-            <p:nvPr/>
-          </p:nvSpPr>
-          <p:spPr>
-            <a:xfrm>
-              <a:off x="847344" y="1493011"/>
-              <a:ext cx="396240" cy="399415"/>
-            </a:xfrm>
-            <a:custGeom>
-              <a:avLst/>
-              <a:gdLst/>
-              <a:ahLst/>
-              <a:cxnLst/>
-              <a:rect l="l" t="t" r="r" b="b"/>
-              <a:pathLst>
-                <a:path w="396240" h="399414">
-                  <a:moveTo>
-                    <a:pt x="210273" y="165176"/>
-                  </a:moveTo>
-                  <a:lnTo>
-                    <a:pt x="188937" y="165176"/>
-                  </a:lnTo>
-                  <a:lnTo>
-                    <a:pt x="188937" y="189484"/>
-                  </a:lnTo>
-                  <a:lnTo>
-                    <a:pt x="210273" y="189484"/>
-                  </a:lnTo>
-                  <a:lnTo>
-                    <a:pt x="210273" y="165176"/>
-                  </a:lnTo>
-                  <a:close/>
-                </a:path>
-                <a:path w="396240" h="399414">
-                  <a:moveTo>
-                    <a:pt x="234607" y="73761"/>
-                  </a:moveTo>
-                  <a:lnTo>
-                    <a:pt x="188937" y="73761"/>
-                  </a:lnTo>
-                  <a:lnTo>
-                    <a:pt x="188937" y="94996"/>
-                  </a:lnTo>
-                  <a:lnTo>
-                    <a:pt x="234607" y="94996"/>
-                  </a:lnTo>
-                  <a:lnTo>
-                    <a:pt x="234607" y="73761"/>
-                  </a:lnTo>
-                  <a:close/>
-                </a:path>
-                <a:path w="396240" h="399414">
-                  <a:moveTo>
-                    <a:pt x="255993" y="119456"/>
-                  </a:moveTo>
-                  <a:lnTo>
-                    <a:pt x="188937" y="119456"/>
-                  </a:lnTo>
-                  <a:lnTo>
-                    <a:pt x="188937" y="140716"/>
-                  </a:lnTo>
-                  <a:lnTo>
-                    <a:pt x="255993" y="140716"/>
-                  </a:lnTo>
-                  <a:lnTo>
-                    <a:pt x="255993" y="119456"/>
-                  </a:lnTo>
-                  <a:close/>
-                </a:path>
-                <a:path w="396240" h="399414">
-                  <a:moveTo>
-                    <a:pt x="303098" y="376301"/>
-                  </a:moveTo>
-                  <a:lnTo>
-                    <a:pt x="258711" y="376301"/>
-                  </a:lnTo>
-                  <a:lnTo>
-                    <a:pt x="258711" y="371233"/>
-                  </a:lnTo>
-                  <a:lnTo>
-                    <a:pt x="136956" y="371233"/>
-                  </a:lnTo>
-                  <a:lnTo>
-                    <a:pt x="136956" y="376301"/>
-                  </a:lnTo>
-                  <a:lnTo>
-                    <a:pt x="93065" y="376301"/>
-                  </a:lnTo>
-                  <a:lnTo>
-                    <a:pt x="93065" y="399415"/>
-                  </a:lnTo>
-                  <a:lnTo>
-                    <a:pt x="303098" y="399415"/>
-                  </a:lnTo>
-                  <a:lnTo>
-                    <a:pt x="303098" y="376301"/>
-                  </a:lnTo>
-                  <a:close/>
-                </a:path>
-                <a:path w="396240" h="399414">
-                  <a:moveTo>
-                    <a:pt x="326097" y="0"/>
-                  </a:moveTo>
-                  <a:lnTo>
-                    <a:pt x="279958" y="0"/>
-                  </a:lnTo>
-                  <a:lnTo>
-                    <a:pt x="279958" y="48260"/>
-                  </a:lnTo>
-                  <a:lnTo>
-                    <a:pt x="279958" y="49530"/>
-                  </a:lnTo>
-                  <a:lnTo>
-                    <a:pt x="256921" y="49530"/>
-                  </a:lnTo>
-                  <a:lnTo>
-                    <a:pt x="256921" y="96520"/>
-                  </a:lnTo>
-                  <a:lnTo>
-                    <a:pt x="279958" y="96520"/>
-                  </a:lnTo>
-                  <a:lnTo>
-                    <a:pt x="279958" y="165100"/>
-                  </a:lnTo>
-                  <a:lnTo>
-                    <a:pt x="233057" y="165100"/>
-                  </a:lnTo>
-                  <a:lnTo>
-                    <a:pt x="233057" y="212090"/>
-                  </a:lnTo>
-                  <a:lnTo>
-                    <a:pt x="163880" y="212090"/>
-                  </a:lnTo>
-                  <a:lnTo>
-                    <a:pt x="163880" y="188468"/>
-                  </a:lnTo>
-                  <a:lnTo>
-                    <a:pt x="163880" y="187960"/>
-                  </a:lnTo>
-                  <a:lnTo>
-                    <a:pt x="163880" y="165862"/>
-                  </a:lnTo>
-                  <a:lnTo>
-                    <a:pt x="140042" y="165862"/>
-                  </a:lnTo>
-                  <a:lnTo>
-                    <a:pt x="140042" y="187960"/>
-                  </a:lnTo>
-                  <a:lnTo>
-                    <a:pt x="116967" y="187960"/>
-                  </a:lnTo>
-                  <a:lnTo>
-                    <a:pt x="116967" y="165100"/>
-                  </a:lnTo>
-                  <a:lnTo>
-                    <a:pt x="163880" y="165100"/>
-                  </a:lnTo>
-                  <a:lnTo>
-                    <a:pt x="163880" y="141224"/>
-                  </a:lnTo>
-                  <a:lnTo>
-                    <a:pt x="163880" y="140970"/>
-                  </a:lnTo>
-                  <a:lnTo>
-                    <a:pt x="163880" y="118884"/>
-                  </a:lnTo>
-                  <a:lnTo>
-                    <a:pt x="140042" y="118884"/>
-                  </a:lnTo>
-                  <a:lnTo>
-                    <a:pt x="140042" y="140970"/>
-                  </a:lnTo>
-                  <a:lnTo>
-                    <a:pt x="116967" y="140970"/>
-                  </a:lnTo>
-                  <a:lnTo>
-                    <a:pt x="116967" y="118110"/>
-                  </a:lnTo>
-                  <a:lnTo>
-                    <a:pt x="163880" y="118110"/>
-                  </a:lnTo>
-                  <a:lnTo>
-                    <a:pt x="163880" y="93980"/>
-                  </a:lnTo>
-                  <a:lnTo>
-                    <a:pt x="163880" y="48260"/>
-                  </a:lnTo>
-                  <a:lnTo>
-                    <a:pt x="279958" y="48260"/>
-                  </a:lnTo>
-                  <a:lnTo>
-                    <a:pt x="279958" y="0"/>
-                  </a:lnTo>
-                  <a:lnTo>
-                    <a:pt x="140042" y="0"/>
-                  </a:lnTo>
-                  <a:lnTo>
-                    <a:pt x="140042" y="71120"/>
-                  </a:lnTo>
-                  <a:lnTo>
-                    <a:pt x="140042" y="93980"/>
-                  </a:lnTo>
-                  <a:lnTo>
-                    <a:pt x="116967" y="93980"/>
-                  </a:lnTo>
-                  <a:lnTo>
-                    <a:pt x="116967" y="71120"/>
-                  </a:lnTo>
-                  <a:lnTo>
-                    <a:pt x="140042" y="71120"/>
-                  </a:lnTo>
-                  <a:lnTo>
-                    <a:pt x="140042" y="0"/>
-                  </a:lnTo>
-                  <a:lnTo>
-                    <a:pt x="70065" y="0"/>
-                  </a:lnTo>
-                  <a:lnTo>
-                    <a:pt x="70065" y="71120"/>
-                  </a:lnTo>
-                  <a:lnTo>
-                    <a:pt x="70065" y="93980"/>
-                  </a:lnTo>
-                  <a:lnTo>
-                    <a:pt x="70065" y="259080"/>
-                  </a:lnTo>
-                  <a:lnTo>
-                    <a:pt x="326097" y="259080"/>
-                  </a:lnTo>
-                  <a:lnTo>
-                    <a:pt x="326097" y="212090"/>
-                  </a:lnTo>
-                  <a:lnTo>
-                    <a:pt x="326097" y="165100"/>
-                  </a:lnTo>
-                  <a:lnTo>
-                    <a:pt x="326097" y="96520"/>
-                  </a:lnTo>
-                  <a:lnTo>
-                    <a:pt x="326097" y="49530"/>
-                  </a:lnTo>
-                  <a:lnTo>
-                    <a:pt x="326097" y="0"/>
-                  </a:lnTo>
-                  <a:close/>
-                </a:path>
-                <a:path w="396240" h="399414">
-                  <a:moveTo>
-                    <a:pt x="396163" y="73469"/>
-                  </a:moveTo>
-                  <a:lnTo>
-                    <a:pt x="348424" y="73469"/>
-                  </a:lnTo>
-                  <a:lnTo>
-                    <a:pt x="348424" y="283210"/>
-                  </a:lnTo>
-                  <a:lnTo>
-                    <a:pt x="209219" y="283210"/>
-                  </a:lnTo>
-                  <a:lnTo>
-                    <a:pt x="209219" y="307340"/>
-                  </a:lnTo>
-                  <a:lnTo>
-                    <a:pt x="209219" y="327660"/>
-                  </a:lnTo>
-                  <a:lnTo>
-                    <a:pt x="209219" y="328930"/>
-                  </a:lnTo>
-                  <a:lnTo>
-                    <a:pt x="186944" y="328930"/>
-                  </a:lnTo>
-                  <a:lnTo>
-                    <a:pt x="186944" y="327660"/>
-                  </a:lnTo>
-                  <a:lnTo>
-                    <a:pt x="186944" y="307340"/>
-                  </a:lnTo>
-                  <a:lnTo>
-                    <a:pt x="209219" y="307340"/>
-                  </a:lnTo>
-                  <a:lnTo>
-                    <a:pt x="209219" y="283210"/>
-                  </a:lnTo>
-                  <a:lnTo>
-                    <a:pt x="47701" y="283210"/>
-                  </a:lnTo>
-                  <a:lnTo>
-                    <a:pt x="47701" y="72390"/>
-                  </a:lnTo>
-                  <a:lnTo>
-                    <a:pt x="0" y="72390"/>
-                  </a:lnTo>
-                  <a:lnTo>
-                    <a:pt x="0" y="283210"/>
-                  </a:lnTo>
-                  <a:lnTo>
-                    <a:pt x="0" y="307340"/>
-                  </a:lnTo>
-                  <a:lnTo>
-                    <a:pt x="0" y="327660"/>
-                  </a:lnTo>
-                  <a:lnTo>
-                    <a:pt x="140004" y="327660"/>
-                  </a:lnTo>
-                  <a:lnTo>
-                    <a:pt x="140004" y="328930"/>
-                  </a:lnTo>
-                  <a:lnTo>
-                    <a:pt x="140004" y="370840"/>
-                  </a:lnTo>
-                  <a:lnTo>
-                    <a:pt x="256159" y="370840"/>
-                  </a:lnTo>
-                  <a:lnTo>
-                    <a:pt x="256159" y="328930"/>
-                  </a:lnTo>
-                  <a:lnTo>
-                    <a:pt x="256159" y="327660"/>
-                  </a:lnTo>
-                  <a:lnTo>
-                    <a:pt x="396163" y="327660"/>
-                  </a:lnTo>
-                  <a:lnTo>
-                    <a:pt x="396163" y="283337"/>
-                  </a:lnTo>
-                  <a:lnTo>
-                    <a:pt x="396163" y="283210"/>
-                  </a:lnTo>
-                  <a:lnTo>
-                    <a:pt x="396163" y="73469"/>
-                  </a:lnTo>
-                  <a:close/>
-                </a:path>
-              </a:pathLst>
-            </a:custGeom>
-            <a:solidFill>
-              <a:srgbClr val="FFFFFF"/>
-            </a:solidFill>
-          </p:spPr>
-          <p:txBody>
-            <a:bodyPr wrap="square" lIns="0" tIns="0" rIns="0" bIns="0" rtlCol="0"/>
-            <a:lstStyle/>
-            <a:p>
-              <a:endParaRPr/>
-            </a:p>
-          </p:txBody>
-        </p:sp>
-      </p:grpSp>
-      <p:grpSp>
-        <p:nvGrpSpPr>
-          <p:cNvPr id="10" name="object 10"/>
-          <p:cNvGrpSpPr/>
-          <p:nvPr/>
-        </p:nvGrpSpPr>
-        <p:grpSpPr>
-          <a:xfrm>
-            <a:off x="786383" y="2465832"/>
-            <a:ext cx="542290" cy="542290"/>
-            <a:chOff x="786383" y="2465832"/>
-            <a:chExt cx="542290" cy="542290"/>
-          </a:xfrm>
-        </p:grpSpPr>
-        <p:sp>
-          <p:nvSpPr>
-            <p:cNvPr id="11" name="object 11"/>
-            <p:cNvSpPr/>
-            <p:nvPr/>
-          </p:nvSpPr>
-          <p:spPr>
-            <a:xfrm>
-              <a:off x="786383" y="2465832"/>
-              <a:ext cx="542290" cy="542290"/>
-            </a:xfrm>
-            <a:custGeom>
-              <a:avLst/>
-              <a:gdLst/>
-              <a:ahLst/>
-              <a:cxnLst/>
-              <a:rect l="l" t="t" r="r" b="b"/>
-              <a:pathLst>
-                <a:path w="542290" h="542289">
-                  <a:moveTo>
-                    <a:pt x="542035" y="0"/>
-                  </a:moveTo>
-                  <a:lnTo>
-                    <a:pt x="0" y="0"/>
-                  </a:lnTo>
-                  <a:lnTo>
-                    <a:pt x="0" y="542036"/>
-                  </a:lnTo>
-                  <a:lnTo>
-                    <a:pt x="542035" y="542036"/>
-                  </a:lnTo>
-                  <a:lnTo>
-                    <a:pt x="542035" y="0"/>
-                  </a:lnTo>
-                  <a:close/>
-                </a:path>
-              </a:pathLst>
-            </a:custGeom>
-            <a:solidFill>
-              <a:srgbClr val="515244"/>
-            </a:solidFill>
-          </p:spPr>
-          <p:txBody>
-            <a:bodyPr wrap="square" lIns="0" tIns="0" rIns="0" bIns="0" rtlCol="0"/>
-            <a:lstStyle/>
-            <a:p>
-              <a:endParaRPr/>
-            </a:p>
-          </p:txBody>
-        </p:sp>
-        <p:pic>
-          <p:nvPicPr>
-            <p:cNvPr id="12" name="object 12"/>
-            <p:cNvPicPr/>
-            <p:nvPr/>
-          </p:nvPicPr>
-          <p:blipFill>
-            <a:blip r:embed="rId2" cstate="print"/>
-            <a:stretch>
-              <a:fillRect/>
-            </a:stretch>
-          </p:blipFill>
-          <p:spPr>
-            <a:xfrm>
-              <a:off x="966215" y="2612136"/>
-              <a:ext cx="164591" cy="185927"/>
-            </a:xfrm>
-            <a:prstGeom prst="rect">
-              <a:avLst/>
-            </a:prstGeom>
-          </p:spPr>
-        </p:pic>
-        <p:sp>
-          <p:nvSpPr>
-            <p:cNvPr id="13" name="object 13"/>
-            <p:cNvSpPr/>
-            <p:nvPr/>
-          </p:nvSpPr>
-          <p:spPr>
-            <a:xfrm>
-              <a:off x="896111" y="2542032"/>
-              <a:ext cx="262255" cy="326390"/>
-            </a:xfrm>
-            <a:custGeom>
-              <a:avLst/>
-              <a:gdLst/>
-              <a:ahLst/>
-              <a:cxnLst/>
-              <a:rect l="l" t="t" r="r" b="b"/>
-              <a:pathLst>
-                <a:path w="262255" h="326389">
-                  <a:moveTo>
-                    <a:pt x="152996" y="0"/>
-                  </a:moveTo>
-                  <a:lnTo>
-                    <a:pt x="104165" y="7747"/>
-                  </a:lnTo>
-                  <a:lnTo>
-                    <a:pt x="104482" y="7747"/>
-                  </a:lnTo>
-                  <a:lnTo>
-                    <a:pt x="62636" y="29082"/>
-                  </a:lnTo>
-                  <a:lnTo>
-                    <a:pt x="29502" y="61975"/>
-                  </a:lnTo>
-                  <a:lnTo>
-                    <a:pt x="7797" y="103250"/>
-                  </a:lnTo>
-                  <a:lnTo>
-                    <a:pt x="0" y="151003"/>
-                  </a:lnTo>
-                  <a:lnTo>
-                    <a:pt x="126" y="175768"/>
-                  </a:lnTo>
-                  <a:lnTo>
-                    <a:pt x="7950" y="223012"/>
-                  </a:lnTo>
-                  <a:lnTo>
-                    <a:pt x="29971" y="264413"/>
-                  </a:lnTo>
-                  <a:lnTo>
-                    <a:pt x="63322" y="297180"/>
-                  </a:lnTo>
-                  <a:lnTo>
-                    <a:pt x="105232" y="318388"/>
-                  </a:lnTo>
-                  <a:lnTo>
-                    <a:pt x="152996" y="326009"/>
-                  </a:lnTo>
-                  <a:lnTo>
-                    <a:pt x="200748" y="318388"/>
-                  </a:lnTo>
-                  <a:lnTo>
-                    <a:pt x="242671" y="297180"/>
-                  </a:lnTo>
-                  <a:lnTo>
-                    <a:pt x="260261" y="279907"/>
-                  </a:lnTo>
-                  <a:lnTo>
-                    <a:pt x="152996" y="279907"/>
-                  </a:lnTo>
-                  <a:lnTo>
-                    <a:pt x="111721" y="271653"/>
-                  </a:lnTo>
-                  <a:lnTo>
-                    <a:pt x="78219" y="249428"/>
-                  </a:lnTo>
-                  <a:lnTo>
-                    <a:pt x="55727" y="216535"/>
-                  </a:lnTo>
-                  <a:lnTo>
-                    <a:pt x="47497" y="175768"/>
-                  </a:lnTo>
-                  <a:lnTo>
-                    <a:pt x="47497" y="151892"/>
-                  </a:lnTo>
-                  <a:lnTo>
-                    <a:pt x="55727" y="111506"/>
-                  </a:lnTo>
-                  <a:lnTo>
-                    <a:pt x="78219" y="78486"/>
-                  </a:lnTo>
-                  <a:lnTo>
-                    <a:pt x="111721" y="56134"/>
-                  </a:lnTo>
-                  <a:lnTo>
-                    <a:pt x="152996" y="47752"/>
-                  </a:lnTo>
-                  <a:lnTo>
-                    <a:pt x="261899" y="47752"/>
-                  </a:lnTo>
-                  <a:lnTo>
-                    <a:pt x="243382" y="29337"/>
-                  </a:lnTo>
-                  <a:lnTo>
-                    <a:pt x="201371" y="7747"/>
-                  </a:lnTo>
-                  <a:lnTo>
-                    <a:pt x="152996" y="0"/>
-                  </a:lnTo>
-                  <a:close/>
-                </a:path>
-              </a:pathLst>
-            </a:custGeom>
-            <a:solidFill>
-              <a:srgbClr val="FFFFFF"/>
-            </a:solidFill>
-          </p:spPr>
-          <p:txBody>
-            <a:bodyPr wrap="square" lIns="0" tIns="0" rIns="0" bIns="0" rtlCol="0"/>
-            <a:lstStyle/>
-            <a:p>
-              <a:endParaRPr/>
-            </a:p>
-          </p:txBody>
-        </p:sp>
-        <p:pic>
-          <p:nvPicPr>
-            <p:cNvPr id="14" name="object 14"/>
-            <p:cNvPicPr/>
-            <p:nvPr/>
-          </p:nvPicPr>
-          <p:blipFill>
-            <a:blip r:embed="rId3" cstate="print"/>
-            <a:stretch>
-              <a:fillRect/>
-            </a:stretch>
-          </p:blipFill>
-          <p:spPr>
-            <a:xfrm>
-              <a:off x="1048511" y="2590800"/>
-              <a:ext cx="152400" cy="231648"/>
-            </a:xfrm>
-            <a:prstGeom prst="rect">
-              <a:avLst/>
-            </a:prstGeom>
-          </p:spPr>
-        </p:pic>
-        <p:pic>
-          <p:nvPicPr>
-            <p:cNvPr id="15" name="object 15"/>
-            <p:cNvPicPr/>
-            <p:nvPr/>
-          </p:nvPicPr>
-          <p:blipFill>
-            <a:blip r:embed="rId4" cstate="print"/>
-            <a:stretch>
-              <a:fillRect/>
-            </a:stretch>
-          </p:blipFill>
-          <p:spPr>
-            <a:xfrm>
-              <a:off x="886967" y="2831592"/>
-              <a:ext cx="131063" cy="106680"/>
-            </a:xfrm>
-            <a:prstGeom prst="rect">
-              <a:avLst/>
-            </a:prstGeom>
-          </p:spPr>
-        </p:pic>
-        <p:pic>
-          <p:nvPicPr>
-            <p:cNvPr id="16" name="object 16"/>
-            <p:cNvPicPr/>
-            <p:nvPr/>
-          </p:nvPicPr>
-          <p:blipFill>
-            <a:blip r:embed="rId5" cstate="print"/>
-            <a:stretch>
-              <a:fillRect/>
-            </a:stretch>
-          </p:blipFill>
-          <p:spPr>
-            <a:xfrm>
-              <a:off x="1078991" y="2831592"/>
-              <a:ext cx="128015" cy="106680"/>
-            </a:xfrm>
-            <a:prstGeom prst="rect">
-              <a:avLst/>
-            </a:prstGeom>
-          </p:spPr>
-        </p:pic>
-      </p:grpSp>
-      <p:sp>
-        <p:nvSpPr>
-          <p:cNvPr id="17" name="object 17"/>
-          <p:cNvSpPr txBox="1"/>
-          <p:nvPr/>
-        </p:nvSpPr>
-        <p:spPr>
-          <a:xfrm>
-            <a:off x="1429638" y="2397849"/>
-            <a:ext cx="1646555" cy="1461939"/>
-          </a:xfrm>
-          <a:prstGeom prst="rect">
-            <a:avLst/>
-          </a:prstGeom>
-        </p:spPr>
-        <p:txBody>
-          <a:bodyPr vert="horz" wrap="square" lIns="0" tIns="68580" rIns="0" bIns="0" rtlCol="0">
-            <a:spAutoFit/>
-          </a:bodyPr>
-          <a:lstStyle/>
-          <a:p>
-            <a:pPr marL="15240">
-              <a:lnSpc>
-                <a:spcPct val="100000"/>
-              </a:lnSpc>
-              <a:spcBef>
-                <a:spcPts val="540"/>
-              </a:spcBef>
-            </a:pPr>
-            <a:r>
-              <a:rPr sz="1600" b="1" spc="-10" dirty="0">
-                <a:solidFill>
-                  <a:srgbClr val="202020"/>
-                </a:solidFill>
-                <a:latin typeface="Arial"/>
-                <a:cs typeface="Arial"/>
-              </a:rPr>
-              <a:t>Habilidades</a:t>
-            </a:r>
-            <a:endParaRPr sz="1600" dirty="0">
-              <a:latin typeface="Arial"/>
-              <a:cs typeface="Arial"/>
-            </a:endParaRPr>
-          </a:p>
-          <a:p>
-            <a:pPr marL="12700" marR="5080">
-              <a:lnSpc>
-                <a:spcPct val="100000"/>
-              </a:lnSpc>
-              <a:spcBef>
-                <a:spcPts val="330"/>
-              </a:spcBef>
-            </a:pPr>
-            <a:r>
-              <a:rPr sz="1200" dirty="0">
-                <a:solidFill>
-                  <a:srgbClr val="202020"/>
-                </a:solidFill>
-                <a:latin typeface="Tahoma"/>
-                <a:cs typeface="Tahoma"/>
-              </a:rPr>
-              <a:t>Martin</a:t>
-            </a:r>
-            <a:r>
-              <a:rPr sz="1200" spc="85" dirty="0">
-                <a:solidFill>
-                  <a:srgbClr val="202020"/>
-                </a:solidFill>
-                <a:latin typeface="Tahoma"/>
-                <a:cs typeface="Tahoma"/>
-              </a:rPr>
-              <a:t> </a:t>
-            </a:r>
-            <a:r>
-              <a:rPr sz="1200" dirty="0">
-                <a:solidFill>
-                  <a:srgbClr val="202020"/>
-                </a:solidFill>
-                <a:latin typeface="Tahoma"/>
-                <a:cs typeface="Tahoma"/>
-              </a:rPr>
-              <a:t>es</a:t>
-            </a:r>
-            <a:r>
-              <a:rPr sz="1200" spc="185" dirty="0">
-                <a:solidFill>
-                  <a:srgbClr val="202020"/>
-                </a:solidFill>
-                <a:latin typeface="Tahoma"/>
-                <a:cs typeface="Tahoma"/>
-              </a:rPr>
-              <a:t> </a:t>
-            </a:r>
-            <a:r>
-              <a:rPr sz="1200" dirty="0">
-                <a:solidFill>
-                  <a:srgbClr val="202020"/>
-                </a:solidFill>
-                <a:latin typeface="Tahoma"/>
-                <a:cs typeface="Tahoma"/>
-              </a:rPr>
-              <a:t>un</a:t>
-            </a:r>
-            <a:r>
-              <a:rPr sz="1200" spc="200" dirty="0">
-                <a:solidFill>
-                  <a:srgbClr val="202020"/>
-                </a:solidFill>
-                <a:latin typeface="Tahoma"/>
-                <a:cs typeface="Tahoma"/>
-              </a:rPr>
-              <a:t> </a:t>
-            </a:r>
-            <a:r>
-              <a:rPr sz="1200" spc="-10" dirty="0">
-                <a:solidFill>
-                  <a:srgbClr val="202020"/>
-                </a:solidFill>
-                <a:latin typeface="Tahoma"/>
-                <a:cs typeface="Tahoma"/>
-              </a:rPr>
-              <a:t>persona </a:t>
-            </a:r>
-            <a:r>
-              <a:rPr sz="1200" dirty="0">
-                <a:solidFill>
-                  <a:srgbClr val="202020"/>
-                </a:solidFill>
-                <a:latin typeface="Tahoma"/>
-                <a:cs typeface="Tahoma"/>
-              </a:rPr>
-              <a:t>muy</a:t>
-            </a:r>
-            <a:r>
-              <a:rPr sz="1200" spc="340" dirty="0">
-                <a:solidFill>
-                  <a:srgbClr val="202020"/>
-                </a:solidFill>
-                <a:latin typeface="Tahoma"/>
-                <a:cs typeface="Tahoma"/>
-              </a:rPr>
-              <a:t> </a:t>
-            </a:r>
-            <a:r>
-              <a:rPr sz="1200" spc="-10" dirty="0">
-                <a:solidFill>
-                  <a:srgbClr val="202020"/>
-                </a:solidFill>
-                <a:latin typeface="Tahoma"/>
-                <a:cs typeface="Tahoma"/>
-              </a:rPr>
-              <a:t>experimentada</a:t>
-            </a:r>
-            <a:r>
-              <a:rPr sz="1200" spc="500" dirty="0">
-                <a:solidFill>
-                  <a:srgbClr val="202020"/>
-                </a:solidFill>
-                <a:latin typeface="Tahoma"/>
-                <a:cs typeface="Tahoma"/>
-              </a:rPr>
-              <a:t>  </a:t>
-            </a:r>
-            <a:r>
-              <a:rPr sz="1200" dirty="0">
-                <a:solidFill>
-                  <a:srgbClr val="202020"/>
-                </a:solidFill>
-                <a:latin typeface="Tahoma"/>
-                <a:cs typeface="Tahoma"/>
-              </a:rPr>
-              <a:t>en</a:t>
-            </a:r>
-            <a:r>
-              <a:rPr sz="1200" spc="55" dirty="0">
-                <a:solidFill>
-                  <a:srgbClr val="202020"/>
-                </a:solidFill>
-                <a:latin typeface="Tahoma"/>
-                <a:cs typeface="Tahoma"/>
-              </a:rPr>
-              <a:t> </a:t>
-            </a:r>
-            <a:r>
-              <a:rPr sz="1200" dirty="0">
-                <a:solidFill>
-                  <a:srgbClr val="202020"/>
-                </a:solidFill>
-                <a:latin typeface="Tahoma"/>
-                <a:cs typeface="Tahoma"/>
-              </a:rPr>
-              <a:t>la</a:t>
-            </a:r>
-            <a:r>
-              <a:rPr sz="1200" spc="-10" dirty="0">
-                <a:solidFill>
-                  <a:srgbClr val="202020"/>
-                </a:solidFill>
-                <a:latin typeface="Tahoma"/>
-                <a:cs typeface="Tahoma"/>
-              </a:rPr>
-              <a:t> </a:t>
-            </a:r>
-            <a:r>
-              <a:rPr sz="1200" dirty="0">
-                <a:solidFill>
-                  <a:srgbClr val="202020"/>
-                </a:solidFill>
-                <a:latin typeface="Tahoma"/>
-                <a:cs typeface="Tahoma"/>
-              </a:rPr>
-              <a:t>parte</a:t>
-            </a:r>
-            <a:r>
-              <a:rPr sz="1200" spc="-20" dirty="0">
-                <a:solidFill>
-                  <a:srgbClr val="202020"/>
-                </a:solidFill>
-                <a:latin typeface="Tahoma"/>
-                <a:cs typeface="Tahoma"/>
-              </a:rPr>
-              <a:t> </a:t>
-            </a:r>
-            <a:r>
-              <a:rPr sz="1200" spc="-25" dirty="0">
-                <a:solidFill>
-                  <a:srgbClr val="202020"/>
-                </a:solidFill>
-                <a:latin typeface="Tahoma"/>
-                <a:cs typeface="Tahoma"/>
-              </a:rPr>
-              <a:t>del </a:t>
-            </a:r>
-            <a:r>
-              <a:rPr sz="1200" dirty="0">
-                <a:solidFill>
-                  <a:srgbClr val="202020"/>
-                </a:solidFill>
-                <a:latin typeface="Tahoma"/>
-                <a:cs typeface="Tahoma"/>
-              </a:rPr>
-              <a:t>Desarrollo</a:t>
-            </a:r>
-            <a:r>
-              <a:rPr sz="1200" spc="190" dirty="0">
-                <a:solidFill>
-                  <a:srgbClr val="202020"/>
-                </a:solidFill>
-                <a:latin typeface="Tahoma"/>
-                <a:cs typeface="Tahoma"/>
-              </a:rPr>
-              <a:t> </a:t>
-            </a:r>
-            <a:r>
-              <a:rPr sz="1200" dirty="0">
-                <a:solidFill>
-                  <a:srgbClr val="202020"/>
-                </a:solidFill>
-                <a:latin typeface="Tahoma"/>
-                <a:cs typeface="Tahoma"/>
-              </a:rPr>
-              <a:t>del</a:t>
-            </a:r>
-            <a:r>
-              <a:rPr sz="1200" spc="60" dirty="0">
-                <a:solidFill>
-                  <a:srgbClr val="202020"/>
-                </a:solidFill>
-                <a:latin typeface="Tahoma"/>
-                <a:cs typeface="Tahoma"/>
-              </a:rPr>
-              <a:t> </a:t>
-            </a:r>
-            <a:r>
-              <a:rPr sz="1200" spc="-10" dirty="0">
-                <a:solidFill>
-                  <a:srgbClr val="202020"/>
-                </a:solidFill>
-                <a:latin typeface="Tahoma"/>
-                <a:cs typeface="Tahoma"/>
-              </a:rPr>
-              <a:t>Backend </a:t>
-            </a:r>
-            <a:r>
-              <a:rPr sz="1200" dirty="0">
-                <a:solidFill>
-                  <a:srgbClr val="202020"/>
-                </a:solidFill>
-                <a:latin typeface="Tahoma"/>
-                <a:cs typeface="Tahoma"/>
-              </a:rPr>
-              <a:t>y</a:t>
-            </a:r>
-            <a:r>
-              <a:rPr sz="1200" spc="35" dirty="0">
-                <a:solidFill>
-                  <a:srgbClr val="202020"/>
-                </a:solidFill>
-                <a:latin typeface="Tahoma"/>
-                <a:cs typeface="Tahoma"/>
-              </a:rPr>
-              <a:t> </a:t>
-            </a:r>
-            <a:r>
-              <a:rPr sz="1200" dirty="0">
-                <a:solidFill>
-                  <a:srgbClr val="202020"/>
-                </a:solidFill>
-                <a:latin typeface="Tahoma"/>
-                <a:cs typeface="Tahoma"/>
-              </a:rPr>
-              <a:t>el</a:t>
-            </a:r>
-            <a:r>
-              <a:rPr sz="1200" spc="10" dirty="0">
-                <a:solidFill>
-                  <a:srgbClr val="202020"/>
-                </a:solidFill>
-                <a:latin typeface="Tahoma"/>
-                <a:cs typeface="Tahoma"/>
-              </a:rPr>
-              <a:t> </a:t>
-            </a:r>
-            <a:r>
-              <a:rPr sz="1200" dirty="0">
-                <a:solidFill>
-                  <a:srgbClr val="202020"/>
-                </a:solidFill>
-                <a:latin typeface="Tahoma"/>
-                <a:cs typeface="Tahoma"/>
-              </a:rPr>
-              <a:t>manejo</a:t>
-            </a:r>
-            <a:r>
-              <a:rPr sz="1200" spc="50" dirty="0">
-                <a:solidFill>
-                  <a:srgbClr val="202020"/>
-                </a:solidFill>
-                <a:latin typeface="Tahoma"/>
-                <a:cs typeface="Tahoma"/>
-              </a:rPr>
-              <a:t> </a:t>
-            </a:r>
-            <a:r>
-              <a:rPr sz="1200" dirty="0">
-                <a:solidFill>
-                  <a:srgbClr val="202020"/>
-                </a:solidFill>
-                <a:latin typeface="Tahoma"/>
-                <a:cs typeface="Tahoma"/>
-              </a:rPr>
-              <a:t>de</a:t>
-            </a:r>
-            <a:r>
-              <a:rPr sz="1200" spc="35" dirty="0">
-                <a:solidFill>
-                  <a:srgbClr val="202020"/>
-                </a:solidFill>
-                <a:latin typeface="Tahoma"/>
-                <a:cs typeface="Tahoma"/>
-              </a:rPr>
-              <a:t> </a:t>
-            </a:r>
-            <a:r>
-              <a:rPr sz="1200" dirty="0">
-                <a:solidFill>
-                  <a:srgbClr val="202020"/>
-                </a:solidFill>
-                <a:latin typeface="Tahoma"/>
-                <a:cs typeface="Tahoma"/>
-              </a:rPr>
-              <a:t>la</a:t>
-            </a:r>
-            <a:r>
-              <a:rPr sz="1200" spc="10" dirty="0">
-                <a:solidFill>
-                  <a:srgbClr val="202020"/>
-                </a:solidFill>
-                <a:latin typeface="Tahoma"/>
-                <a:cs typeface="Tahoma"/>
-              </a:rPr>
-              <a:t> </a:t>
-            </a:r>
-            <a:r>
-              <a:rPr sz="1200" spc="-10" dirty="0" err="1">
-                <a:solidFill>
-                  <a:srgbClr val="202020"/>
-                </a:solidFill>
-                <a:latin typeface="Tahoma"/>
-                <a:cs typeface="Tahoma"/>
-              </a:rPr>
-              <a:t>lógica</a:t>
-            </a:r>
-            <a:r>
-              <a:rPr lang="es-ES" sz="1200" spc="-10" dirty="0">
-                <a:solidFill>
-                  <a:srgbClr val="202020"/>
-                </a:solidFill>
-                <a:latin typeface="Tahoma"/>
-                <a:cs typeface="Tahoma"/>
-              </a:rPr>
-              <a:t>.</a:t>
-            </a:r>
-            <a:endParaRPr sz="1200" dirty="0">
-              <a:latin typeface="Tahoma"/>
-              <a:cs typeface="Tahoma"/>
-            </a:endParaRPr>
-          </a:p>
-        </p:txBody>
-      </p:sp>
-      <p:pic>
-        <p:nvPicPr>
-          <p:cNvPr id="18" name="object 18"/>
-          <p:cNvPicPr/>
-          <p:nvPr/>
-        </p:nvPicPr>
-        <p:blipFill>
-          <a:blip r:embed="rId6" cstate="print"/>
-          <a:stretch>
-            <a:fillRect/>
-          </a:stretch>
-        </p:blipFill>
-        <p:spPr>
-          <a:xfrm>
-            <a:off x="8031480" y="4072127"/>
-            <a:ext cx="1005840" cy="981456"/>
-          </a:xfrm>
-          <a:prstGeom prst="rect">
-            <a:avLst/>
-          </a:prstGeom>
-        </p:spPr>
-      </p:pic>
-      <p:pic>
-        <p:nvPicPr>
-          <p:cNvPr id="19" name="object 19"/>
-          <p:cNvPicPr/>
-          <p:nvPr/>
-        </p:nvPicPr>
-        <p:blipFill>
-          <a:blip r:embed="rId7" cstate="print"/>
-          <a:stretch>
-            <a:fillRect/>
-          </a:stretch>
-        </p:blipFill>
-        <p:spPr>
-          <a:xfrm>
-            <a:off x="314908" y="125451"/>
-            <a:ext cx="881745" cy="846797"/>
-          </a:xfrm>
-          <a:prstGeom prst="rect">
-            <a:avLst/>
-          </a:prstGeom>
-        </p:spPr>
-      </p:pic>
-      <p:pic>
-        <p:nvPicPr>
-          <p:cNvPr id="21" name="Imagen 20" descr="Un hombre con una camisa azul&#10;&#10;El contenido generado por IA puede ser incorrecto.">
-            <a:extLst>
-              <a:ext uri="{FF2B5EF4-FFF2-40B4-BE49-F238E27FC236}">
-                <a16:creationId xmlns:a16="http://schemas.microsoft.com/office/drawing/2014/main" id="{F883E481-0893-838F-FF39-6CAFB9EC2466}"/>
-              </a:ext>
-            </a:extLst>
-          </p:cNvPr>
-          <p:cNvPicPr>
-            <a:picLocks noChangeAspect="1"/>
-          </p:cNvPicPr>
-          <p:nvPr/>
-        </p:nvPicPr>
-        <p:blipFill>
-          <a:blip r:embed="rId8" cstate="print">
-            <a:extLst>
-              <a:ext uri="{28A0092B-C50C-407E-A947-70E740481C1C}">
-                <a14:useLocalDpi xmlns:a14="http://schemas.microsoft.com/office/drawing/2010/main" val="0"/>
-              </a:ext>
-            </a:extLst>
-          </a:blip>
-          <a:srcRect l="19796" t="7674" r="30525"/>
-          <a:stretch>
-            <a:fillRect/>
-          </a:stretch>
-        </p:blipFill>
-        <p:spPr>
-          <a:xfrm>
-            <a:off x="3608831" y="1271904"/>
-            <a:ext cx="1770889" cy="2373503"/>
-          </a:xfrm>
-          <a:prstGeom prst="rect">
-            <a:avLst/>
-          </a:prstGeom>
-        </p:spPr>
-      </p:pic>
-    </p:spTree>
-  </p:cSld>
-  <p:clrMapOvr>
-    <a:masterClrMapping/>
-  </p:clrMapOvr>
-</p:sld>
-</file>
-
-<file path=ppt/slides/slide3.xml><?xml version="1.0" encoding="utf-8"?>
-<p:sld xmlns:a="http://schemas.openxmlformats.org/drawingml/2006/main" xmlns:r="http://schemas.openxmlformats.org/officeDocument/2006/relationships" xmlns:p="http://schemas.openxmlformats.org/presentationml/2006/main">
-  <p:cSld>
-    <p:spTree>
-      <p:nvGrpSpPr>
-        <p:cNvPr id="1" name=""/>
-        <p:cNvGrpSpPr/>
-        <p:nvPr/>
-      </p:nvGrpSpPr>
-      <p:grpSpPr>
-        <a:xfrm>
-          <a:off x="0" y="0"/>
-          <a:ext cx="0" cy="0"/>
-          <a:chOff x="0" y="0"/>
-          <a:chExt cx="0" cy="0"/>
-        </a:xfrm>
-      </p:grpSpPr>
-      <p:sp>
-        <p:nvSpPr>
-          <p:cNvPr id="2" name="object 2"/>
-          <p:cNvSpPr txBox="1">
-            <a:spLocks noGrp="1"/>
-          </p:cNvSpPr>
-          <p:nvPr>
-            <p:ph type="title"/>
-          </p:nvPr>
-        </p:nvSpPr>
-        <p:spPr>
-          <a:prstGeom prst="rect">
-            <a:avLst/>
-          </a:prstGeom>
-        </p:spPr>
-        <p:txBody>
-          <a:bodyPr vert="horz" wrap="square" lIns="0" tIns="12700" rIns="0" bIns="0" rtlCol="0">
-            <a:spAutoFit/>
-          </a:bodyPr>
-          <a:lstStyle/>
-          <a:p>
-            <a:pPr marL="1189355">
-              <a:lnSpc>
-                <a:spcPct val="100000"/>
-              </a:lnSpc>
-              <a:spcBef>
-                <a:spcPts val="100"/>
-              </a:spcBef>
-            </a:pPr>
-            <a:r>
-              <a:rPr spc="-10" dirty="0"/>
-              <a:t>Desarrollador</a:t>
-            </a:r>
-          </a:p>
-        </p:txBody>
-      </p:sp>
-      <p:sp>
-        <p:nvSpPr>
-          <p:cNvPr id="3" name="object 3"/>
-          <p:cNvSpPr txBox="1"/>
-          <p:nvPr/>
-        </p:nvSpPr>
-        <p:spPr>
-          <a:xfrm>
             <a:off x="1412494" y="1330348"/>
             <a:ext cx="1404620" cy="1032975"/>
           </a:xfrm>
@@ -8905,7 +7439,7 @@
 </p:sld>
 </file>
 
-<file path=ppt/slides/slide4.xml><?xml version="1.0" encoding="utf-8"?>
+<file path=ppt/slides/slide3.xml><?xml version="1.0" encoding="utf-8"?>
 <p:sld xmlns:a="http://schemas.openxmlformats.org/drawingml/2006/main" xmlns:r="http://schemas.openxmlformats.org/officeDocument/2006/relationships" xmlns:p="http://schemas.openxmlformats.org/presentationml/2006/main">
   <p:cSld>
     <p:spTree>
@@ -10210,7 +8744,7 @@
 </p:sld>
 </file>
 
-<file path=ppt/slides/slide5.xml><?xml version="1.0" encoding="utf-8"?>
+<file path=ppt/slides/slide4.xml><?xml version="1.0" encoding="utf-8"?>
 <p:sld xmlns:a="http://schemas.openxmlformats.org/drawingml/2006/main" xmlns:r="http://schemas.openxmlformats.org/officeDocument/2006/relationships" xmlns:p="http://schemas.openxmlformats.org/presentationml/2006/main" showMasterSp="0">
   <p:cSld>
     <p:spTree>
@@ -12144,14 +10678,14 @@
           <p:nvPr>
             <p:extLst>
               <p:ext uri="{D42A27DB-BD31-4B8C-83A1-F6EECF244321}">
-                <p14:modId xmlns:p14="http://schemas.microsoft.com/office/powerpoint/2010/main" val="3949489203"/>
+                <p14:modId xmlns:p14="http://schemas.microsoft.com/office/powerpoint/2010/main" val="1369440788"/>
               </p:ext>
             </p:extLst>
           </p:nvPr>
         </p:nvGraphicFramePr>
         <p:xfrm>
           <a:off x="523875" y="1750885"/>
-          <a:ext cx="8039100" cy="1140460"/>
+          <a:ext cx="8039100" cy="758190"/>
         </p:xfrm>
         <a:graphic>
           <a:graphicData uri="http://schemas.openxmlformats.org/drawingml/2006/table">
@@ -12371,172 +10905,6 @@
                   </a:ext>
                 </a:extLst>
               </a:tr>
-              <a:tr h="382270">
-                <a:tc>
-                  <a:txBody>
-                    <a:bodyPr/>
-                    <a:lstStyle/>
-                    <a:p>
-                      <a:pPr marL="91440">
-                        <a:lnSpc>
-                          <a:spcPct val="100000"/>
-                        </a:lnSpc>
-                        <a:spcBef>
-                          <a:spcPts val="915"/>
-                        </a:spcBef>
-                      </a:pPr>
-                      <a:r>
-                        <a:rPr sz="1000" b="1" u="sng" dirty="0">
-                          <a:solidFill>
-                            <a:srgbClr val="202020"/>
-                          </a:solidFill>
-                          <a:uFill>
-                            <a:solidFill>
-                              <a:srgbClr val="202020"/>
-                            </a:solidFill>
-                          </a:uFill>
-                          <a:latin typeface="Tahoma"/>
-                          <a:cs typeface="Tahoma"/>
-                        </a:rPr>
-                        <a:t>MartinStiben</a:t>
-                      </a:r>
-                      <a:r>
-                        <a:rPr sz="1000" b="1" u="sng" spc="-140" dirty="0">
-                          <a:solidFill>
-                            <a:srgbClr val="202020"/>
-                          </a:solidFill>
-                          <a:uFill>
-                            <a:solidFill>
-                              <a:srgbClr val="202020"/>
-                            </a:solidFill>
-                          </a:uFill>
-                          <a:latin typeface="Tahoma"/>
-                          <a:cs typeface="Tahoma"/>
-                        </a:rPr>
-                        <a:t> </a:t>
-                      </a:r>
-                      <a:r>
-                        <a:rPr sz="1000" b="1" u="sng" spc="-10" dirty="0">
-                          <a:solidFill>
-                            <a:srgbClr val="202020"/>
-                          </a:solidFill>
-                          <a:uFill>
-                            <a:solidFill>
-                              <a:srgbClr val="202020"/>
-                            </a:solidFill>
-                          </a:uFill>
-                          <a:latin typeface="Tahoma"/>
-                          <a:cs typeface="Tahoma"/>
-                        </a:rPr>
-                        <a:t>Narváez</a:t>
-                      </a:r>
-                      <a:endParaRPr sz="1000">
-                        <a:latin typeface="Tahoma"/>
-                        <a:cs typeface="Tahoma"/>
-                      </a:endParaRPr>
-                    </a:p>
-                  </a:txBody>
-                  <a:tcPr marL="0" marR="0" marT="116205" marB="0">
-                    <a:lnL w="9525">
-                      <a:solidFill>
-                        <a:srgbClr val="FFFFFF"/>
-                      </a:solidFill>
-                      <a:prstDash val="solid"/>
-                    </a:lnL>
-                    <a:lnR w="9525">
-                      <a:solidFill>
-                        <a:srgbClr val="FFFFFF"/>
-                      </a:solidFill>
-                      <a:prstDash val="solid"/>
-                    </a:lnR>
-                    <a:lnT w="9525">
-                      <a:solidFill>
-                        <a:srgbClr val="FFFFFF"/>
-                      </a:solidFill>
-                      <a:prstDash val="solid"/>
-                    </a:lnT>
-                    <a:lnB w="9525">
-                      <a:solidFill>
-                        <a:srgbClr val="FFFFFF"/>
-                      </a:solidFill>
-                      <a:prstDash val="solid"/>
-                    </a:lnB>
-                    <a:solidFill>
-                      <a:srgbClr val="CCD2AC"/>
-                    </a:solidFill>
-                  </a:tcPr>
-                </a:tc>
-                <a:tc>
-                  <a:txBody>
-                    <a:bodyPr/>
-                    <a:lstStyle/>
-                    <a:p>
-                      <a:pPr marL="92075">
-                        <a:lnSpc>
-                          <a:spcPct val="100000"/>
-                        </a:lnSpc>
-                        <a:spcBef>
-                          <a:spcPts val="915"/>
-                        </a:spcBef>
-                      </a:pPr>
-                      <a:r>
-                        <a:rPr sz="1000" u="sng" spc="-10" dirty="0">
-                          <a:solidFill>
-                            <a:srgbClr val="202020"/>
-                          </a:solidFill>
-                          <a:uFill>
-                            <a:solidFill>
-                              <a:srgbClr val="202020"/>
-                            </a:solidFill>
-                          </a:uFill>
-                          <a:latin typeface="Tahoma"/>
-                          <a:cs typeface="Tahoma"/>
-                          <a:hlinkClick r:id="rId4"/>
-                        </a:rPr>
-                        <a:t>msnarvaez21@soy.sena.edu.co</a:t>
-                      </a:r>
-                      <a:endParaRPr sz="1000">
-                        <a:latin typeface="Tahoma"/>
-                        <a:cs typeface="Tahoma"/>
-                      </a:endParaRPr>
-                    </a:p>
-                  </a:txBody>
-                  <a:tcPr marL="0" marR="0" marT="116205" marB="0">
-                    <a:lnL w="9525">
-                      <a:solidFill>
-                        <a:srgbClr val="FFFFFF"/>
-                      </a:solidFill>
-                      <a:prstDash val="solid"/>
-                    </a:lnL>
-                    <a:lnR w="9525">
-                      <a:solidFill>
-                        <a:srgbClr val="FFFFFF"/>
-                      </a:solidFill>
-                      <a:prstDash val="solid"/>
-                    </a:lnR>
-                    <a:lnT w="9525">
-                      <a:solidFill>
-                        <a:srgbClr val="FFFFFF"/>
-                      </a:solidFill>
-                      <a:prstDash val="solid"/>
-                    </a:lnT>
-                    <a:lnB w="9525">
-                      <a:solidFill>
-                        <a:srgbClr val="FFFFFF"/>
-                      </a:solidFill>
-                      <a:prstDash val="solid"/>
-                    </a:lnB>
-                    <a:solidFill>
-                      <a:srgbClr val="EBEBEB"/>
-                    </a:solidFill>
-                  </a:tcPr>
-                </a:tc>
-                <a:extLst>
-                  <a:ext uri="{0D108BD9-81ED-4DB2-BD59-A6C34878D82A}">
-                    <a16:rowId xmlns:a16="http://schemas.microsoft.com/office/drawing/2014/main" val="10001"/>
-                  </a:ext>
-                </a:extLst>
-              </a:tr>
               <a:tr h="400685">
                 <a:tc>
                   <a:txBody>
@@ -12596,7 +10964,7 @@
                         </a:rPr>
                         <a:t>Olaya</a:t>
                       </a:r>
-                      <a:endParaRPr sz="1000">
+                      <a:endParaRPr sz="1000" dirty="0">
                         <a:latin typeface="Tahoma"/>
                         <a:cs typeface="Tahoma"/>
                       </a:endParaRPr>
@@ -12609,17 +10977,23 @@
                       </a:solidFill>
                       <a:prstDash val="solid"/>
                     </a:lnL>
-                    <a:lnR w="9525">
+                    <a:lnR w="9525" cap="flat" cmpd="sng" algn="ctr">
                       <a:solidFill>
                         <a:srgbClr val="FFFFFF"/>
                       </a:solidFill>
                       <a:prstDash val="solid"/>
+                      <a:round/>
+                      <a:headEnd type="none" w="med" len="med"/>
+                      <a:tailEnd type="none" w="med" len="med"/>
                     </a:lnR>
-                    <a:lnT w="9525">
+                    <a:lnT w="9525" cap="flat" cmpd="sng" algn="ctr">
                       <a:solidFill>
                         <a:srgbClr val="FFFFFF"/>
                       </a:solidFill>
                       <a:prstDash val="solid"/>
+                      <a:round/>
+                      <a:headEnd type="none" w="med" len="med"/>
+                      <a:tailEnd type="none" w="med" len="med"/>
                     </a:lnT>
                     <a:lnB w="9525">
                       <a:solidFill>
@@ -12657,7 +11031,7 @@
                           </a:uFill>
                           <a:latin typeface="Tahoma"/>
                           <a:cs typeface="Tahoma"/>
-                          <a:hlinkClick r:id="rId5"/>
+                          <a:hlinkClick r:id="rId4"/>
                         </a:rPr>
                         <a:t>rprada82@soy.sena.edu.co</a:t>
                       </a:r>
@@ -12668,11 +11042,14 @@
                     </a:p>
                   </a:txBody>
                   <a:tcPr marL="0" marR="0" marT="116839" marB="0">
-                    <a:lnL w="9525">
+                    <a:lnL w="9525" cap="flat" cmpd="sng" algn="ctr">
                       <a:solidFill>
                         <a:srgbClr val="FFFFFF"/>
                       </a:solidFill>
                       <a:prstDash val="solid"/>
+                      <a:round/>
+                      <a:headEnd type="none" w="med" len="med"/>
+                      <a:tailEnd type="none" w="med" len="med"/>
                     </a:lnL>
                     <a:lnR w="9525">
                       <a:solidFill>
@@ -12680,11 +11057,14 @@
                       </a:solidFill>
                       <a:prstDash val="solid"/>
                     </a:lnR>
-                    <a:lnT w="9525">
+                    <a:lnT w="9525" cap="flat" cmpd="sng" algn="ctr">
                       <a:solidFill>
                         <a:srgbClr val="FFFFFF"/>
                       </a:solidFill>
                       <a:prstDash val="solid"/>
+                      <a:round/>
+                      <a:headEnd type="none" w="med" len="med"/>
+                      <a:tailEnd type="none" w="med" len="med"/>
                     </a:lnT>
                     <a:lnB w="9525">
                       <a:solidFill>
@@ -12829,7 +11209,7 @@
           <p:nvPr/>
         </p:nvPicPr>
         <p:blipFill>
-          <a:blip r:embed="rId6" cstate="print"/>
+          <a:blip r:embed="rId5" cstate="print"/>
           <a:stretch>
             <a:fillRect/>
           </a:stretch>
@@ -12852,7 +11232,7 @@
 </p:sld>
 </file>
 
-<file path=ppt/slides/slide6.xml><?xml version="1.0" encoding="utf-8"?>
+<file path=ppt/slides/slide5.xml><?xml version="1.0" encoding="utf-8"?>
 <p:sld xmlns:a="http://schemas.openxmlformats.org/drawingml/2006/main" xmlns:r="http://schemas.openxmlformats.org/officeDocument/2006/relationships" xmlns:p="http://schemas.openxmlformats.org/presentationml/2006/main">
   <p:cSld>
     <p:spTree>
@@ -13120,268 +11500,6 @@
     <p:extLst>
       <p:ext uri="{BB962C8B-B14F-4D97-AF65-F5344CB8AC3E}">
         <p14:creationId xmlns:p14="http://schemas.microsoft.com/office/powerpoint/2010/main" val="2371063674"/>
-      </p:ext>
-    </p:extLst>
-  </p:cSld>
-  <p:clrMapOvr>
-    <a:masterClrMapping/>
-  </p:clrMapOvr>
-</p:sld>
-</file>
-
-<file path=ppt/slides/slide7.xml><?xml version="1.0" encoding="utf-8"?>
-<p:sld xmlns:a="http://schemas.openxmlformats.org/drawingml/2006/main" xmlns:r="http://schemas.openxmlformats.org/officeDocument/2006/relationships" xmlns:p="http://schemas.openxmlformats.org/presentationml/2006/main">
-  <p:cSld>
-    <p:spTree>
-      <p:nvGrpSpPr>
-        <p:cNvPr id="1" name="">
-          <a:extLst>
-            <a:ext uri="{FF2B5EF4-FFF2-40B4-BE49-F238E27FC236}">
-              <a16:creationId xmlns:a16="http://schemas.microsoft.com/office/drawing/2014/main" id="{66C22AA9-6107-B98E-DEC6-74B9CC0C33C2}"/>
-            </a:ext>
-          </a:extLst>
-        </p:cNvPr>
-        <p:cNvGrpSpPr/>
-        <p:nvPr/>
-      </p:nvGrpSpPr>
-      <p:grpSpPr>
-        <a:xfrm>
-          <a:off x="0" y="0"/>
-          <a:ext cx="0" cy="0"/>
-          <a:chOff x="0" y="0"/>
-          <a:chExt cx="0" cy="0"/>
-        </a:xfrm>
-      </p:grpSpPr>
-      <p:sp>
-        <p:nvSpPr>
-          <p:cNvPr id="2" name="object 2">
-            <a:extLst>
-              <a:ext uri="{FF2B5EF4-FFF2-40B4-BE49-F238E27FC236}">
-                <a16:creationId xmlns:a16="http://schemas.microsoft.com/office/drawing/2014/main" id="{EC48D867-753F-DDD8-486C-2D1F98EEBF4A}"/>
-              </a:ext>
-            </a:extLst>
-          </p:cNvPr>
-          <p:cNvSpPr txBox="1">
-            <a:spLocks noGrp="1"/>
-          </p:cNvSpPr>
-          <p:nvPr>
-            <p:ph type="title"/>
-          </p:nvPr>
-        </p:nvSpPr>
-        <p:spPr>
-          <a:xfrm>
-            <a:off x="1981200" y="240591"/>
-            <a:ext cx="4801359" cy="566822"/>
-          </a:xfrm>
-          <a:prstGeom prst="rect">
-            <a:avLst/>
-          </a:prstGeom>
-        </p:spPr>
-        <p:txBody>
-          <a:bodyPr vert="horz" wrap="square" lIns="0" tIns="12700" rIns="0" bIns="0" rtlCol="0">
-            <a:spAutoFit/>
-          </a:bodyPr>
-          <a:lstStyle/>
-          <a:p>
-            <a:pPr marL="1189355" algn="l">
-              <a:lnSpc>
-                <a:spcPct val="100000"/>
-              </a:lnSpc>
-              <a:spcBef>
-                <a:spcPts val="100"/>
-              </a:spcBef>
-            </a:pPr>
-            <a:r>
-              <a:rPr lang="es-ES" sz="3600" spc="-10" dirty="0"/>
-              <a:t>Credenciales</a:t>
-            </a:r>
-            <a:endParaRPr sz="3600" spc="-10" dirty="0"/>
-          </a:p>
-        </p:txBody>
-      </p:sp>
-      <p:sp>
-        <p:nvSpPr>
-          <p:cNvPr id="3" name="object 3">
-            <a:extLst>
-              <a:ext uri="{FF2B5EF4-FFF2-40B4-BE49-F238E27FC236}">
-                <a16:creationId xmlns:a16="http://schemas.microsoft.com/office/drawing/2014/main" id="{00F09FD4-30FD-8B8E-8B78-703A72F4EAAC}"/>
-              </a:ext>
-            </a:extLst>
-          </p:cNvPr>
-          <p:cNvSpPr txBox="1"/>
-          <p:nvPr/>
-        </p:nvSpPr>
-        <p:spPr>
-          <a:xfrm>
-            <a:off x="1040381" y="831850"/>
-            <a:ext cx="6682995" cy="1161215"/>
-          </a:xfrm>
-          <a:prstGeom prst="rect">
-            <a:avLst/>
-          </a:prstGeom>
-        </p:spPr>
-        <p:txBody>
-          <a:bodyPr vert="horz" wrap="square" lIns="0" tIns="139065" rIns="0" bIns="0" rtlCol="0">
-            <a:spAutoFit/>
-          </a:bodyPr>
-          <a:lstStyle/>
-          <a:p>
-            <a:pPr marL="12700" algn="ctr">
-              <a:lnSpc>
-                <a:spcPct val="100000"/>
-              </a:lnSpc>
-              <a:spcBef>
-                <a:spcPts val="1095"/>
-              </a:spcBef>
-            </a:pPr>
-            <a:r>
-              <a:rPr lang="es-ES" sz="1600" b="1" spc="-10" dirty="0">
-                <a:solidFill>
-                  <a:srgbClr val="202020"/>
-                </a:solidFill>
-                <a:latin typeface="Arial"/>
-                <a:cs typeface="Arial"/>
-              </a:rPr>
-              <a:t>Usuario: master</a:t>
-            </a:r>
-          </a:p>
-          <a:p>
-            <a:pPr marL="12700" algn="ctr">
-              <a:lnSpc>
-                <a:spcPct val="100000"/>
-              </a:lnSpc>
-              <a:spcBef>
-                <a:spcPts val="1095"/>
-              </a:spcBef>
-            </a:pPr>
-            <a:r>
-              <a:rPr lang="es-ES" sz="1600" b="1" spc="-10" dirty="0">
-                <a:solidFill>
-                  <a:srgbClr val="202020"/>
-                </a:solidFill>
-                <a:latin typeface="Arial"/>
-                <a:cs typeface="Arial"/>
-              </a:rPr>
-              <a:t>Contraseña: Master$2025!</a:t>
-            </a:r>
-          </a:p>
-          <a:p>
-            <a:pPr marL="12700" algn="ctr">
-              <a:lnSpc>
-                <a:spcPct val="100000"/>
-              </a:lnSpc>
-              <a:spcBef>
-                <a:spcPts val="1095"/>
-              </a:spcBef>
-            </a:pPr>
-            <a:r>
-              <a:rPr lang="es-ES" sz="1600" b="1" spc="-10" dirty="0">
-                <a:solidFill>
-                  <a:srgbClr val="202020"/>
-                </a:solidFill>
-                <a:latin typeface="Arial"/>
-                <a:cs typeface="Arial"/>
-              </a:rPr>
-              <a:t>Red: Funcionario</a:t>
-            </a:r>
-            <a:endParaRPr sz="1600" dirty="0">
-              <a:latin typeface="Arial"/>
-              <a:cs typeface="Arial"/>
-            </a:endParaRPr>
-          </a:p>
-        </p:txBody>
-      </p:sp>
-      <p:pic>
-        <p:nvPicPr>
-          <p:cNvPr id="14" name="object 14">
-            <a:extLst>
-              <a:ext uri="{FF2B5EF4-FFF2-40B4-BE49-F238E27FC236}">
-                <a16:creationId xmlns:a16="http://schemas.microsoft.com/office/drawing/2014/main" id="{50ED6458-1A6C-65C7-4C41-A7EACDD34028}"/>
-              </a:ext>
-            </a:extLst>
-          </p:cNvPr>
-          <p:cNvPicPr/>
-          <p:nvPr/>
-        </p:nvPicPr>
-        <p:blipFill>
-          <a:blip r:embed="rId2" cstate="print"/>
-          <a:stretch>
-            <a:fillRect/>
-          </a:stretch>
-        </p:blipFill>
-        <p:spPr>
-          <a:xfrm>
-            <a:off x="8153400" y="4184650"/>
-            <a:ext cx="944879" cy="920496"/>
-          </a:xfrm>
-          <a:prstGeom prst="rect">
-            <a:avLst/>
-          </a:prstGeom>
-        </p:spPr>
-      </p:pic>
-      <p:pic>
-        <p:nvPicPr>
-          <p:cNvPr id="18" name="object 18">
-            <a:extLst>
-              <a:ext uri="{FF2B5EF4-FFF2-40B4-BE49-F238E27FC236}">
-                <a16:creationId xmlns:a16="http://schemas.microsoft.com/office/drawing/2014/main" id="{81C76703-D50E-23C2-67C5-18CA99D2A2D3}"/>
-              </a:ext>
-            </a:extLst>
-          </p:cNvPr>
-          <p:cNvPicPr/>
-          <p:nvPr/>
-        </p:nvPicPr>
-        <p:blipFill>
-          <a:blip r:embed="rId3" cstate="print"/>
-          <a:stretch>
-            <a:fillRect/>
-          </a:stretch>
-        </p:blipFill>
-        <p:spPr>
-          <a:xfrm>
-            <a:off x="11151" y="125450"/>
-            <a:ext cx="881745" cy="846797"/>
-          </a:xfrm>
-          <a:prstGeom prst="rect">
-            <a:avLst/>
-          </a:prstGeom>
-        </p:spPr>
-      </p:pic>
-      <p:pic>
-        <p:nvPicPr>
-          <p:cNvPr id="5" name="Imagen 4">
-            <a:extLst>
-              <a:ext uri="{FF2B5EF4-FFF2-40B4-BE49-F238E27FC236}">
-                <a16:creationId xmlns:a16="http://schemas.microsoft.com/office/drawing/2014/main" id="{4656A687-08D2-5807-7EBB-C2CD6B46FA8B}"/>
-              </a:ext>
-            </a:extLst>
-          </p:cNvPr>
-          <p:cNvPicPr>
-            <a:picLocks noChangeAspect="1"/>
-          </p:cNvPicPr>
-          <p:nvPr/>
-        </p:nvPicPr>
-        <p:blipFill>
-          <a:blip r:embed="rId4"/>
-          <a:srcRect l="3838" r="-1"/>
-          <a:stretch>
-            <a:fillRect/>
-          </a:stretch>
-        </p:blipFill>
-        <p:spPr>
-          <a:xfrm>
-            <a:off x="3505200" y="2291712"/>
-            <a:ext cx="1909301" cy="2353186"/>
-          </a:xfrm>
-          <a:prstGeom prst="rect">
-            <a:avLst/>
-          </a:prstGeom>
-        </p:spPr>
-      </p:pic>
-    </p:spTree>
-    <p:extLst>
-      <p:ext uri="{BB962C8B-B14F-4D97-AF65-F5344CB8AC3E}">
-        <p14:creationId xmlns:p14="http://schemas.microsoft.com/office/powerpoint/2010/main" val="1292334076"/>
       </p:ext>
     </p:extLst>
   </p:cSld>
@@ -13675,6 +11793,26 @@
 </file>
 
 <file path=customXml/item1.xml><?xml version="1.0" encoding="utf-8"?>
+<p:properties xmlns:p="http://schemas.microsoft.com/office/2006/metadata/properties" xmlns:xsi="http://www.w3.org/2001/XMLSchema-instance" xmlns:pc="http://schemas.microsoft.com/office/infopath/2007/PartnerControls">
+  <documentManagement>
+    <TaxCatchAll xmlns="8e4e03e1-f8b1-44af-8a18-d6c17e30f4d4" xsi:nil="true"/>
+    <lcf76f155ced4ddcb4097134ff3c332f xmlns="e3f02ce4-f17e-46f8-88f7-72120ec08e56">
+      <Terms xmlns="http://schemas.microsoft.com/office/infopath/2007/PartnerControls"/>
+    </lcf76f155ced4ddcb4097134ff3c332f>
+  </documentManagement>
+</p:properties>
+</file>
+
+<file path=customXml/item2.xml><?xml version="1.0" encoding="utf-8"?>
+<?mso-contentType ?>
+<FormTemplates xmlns="http://schemas.microsoft.com/sharepoint/v3/contenttype/forms">
+  <Display>DocumentLibraryForm</Display>
+  <Edit>DocumentLibraryForm</Edit>
+  <New>DocumentLibraryForm</New>
+</FormTemplates>
+</file>
+
+<file path=customXml/item3.xml><?xml version="1.0" encoding="utf-8"?>
 <ct:contentTypeSchema xmlns:ct="http://schemas.microsoft.com/office/2006/metadata/contentType" xmlns:ma="http://schemas.microsoft.com/office/2006/metadata/properties/metaAttributes" ct:_="" ma:_="" ma:contentTypeName="Document" ma:contentTypeID="0x01010029D82C79E9C45A4F8892A5168669910F" ma:contentTypeVersion="12" ma:contentTypeDescription="Create a new document." ma:contentTypeScope="" ma:versionID="1ea8e158fdb56c00ff9dbd260d4d852a">
   <xsd:schema xmlns:xsd="http://www.w3.org/2001/XMLSchema" xmlns:xs="http://www.w3.org/2001/XMLSchema" xmlns:p="http://schemas.microsoft.com/office/2006/metadata/properties" xmlns:ns2="e3f02ce4-f17e-46f8-88f7-72120ec08e56" xmlns:ns3="8e4e03e1-f8b1-44af-8a18-d6c17e30f4d4" targetNamespace="http://schemas.microsoft.com/office/2006/metadata/properties" ma:root="true" ma:fieldsID="dfc354b75f42f41b3089271a87c970f8" ns2:_="" ns3:_="">
     <xsd:import namespace="e3f02ce4-f17e-46f8-88f7-72120ec08e56"/>
@@ -13875,34 +12013,40 @@
 </ct:contentTypeSchema>
 </file>
 
-<file path=customXml/item2.xml><?xml version="1.0" encoding="utf-8"?>
-<?mso-contentType ?>
-<FormTemplates xmlns="http://schemas.microsoft.com/sharepoint/v3/contenttype/forms">
-  <Display>DocumentLibraryForm</Display>
-  <Edit>DocumentLibraryForm</Edit>
-  <New>DocumentLibraryForm</New>
-</FormTemplates>
-</file>
-
-<file path=customXml/item3.xml><?xml version="1.0" encoding="utf-8"?>
-<p:properties xmlns:p="http://schemas.microsoft.com/office/2006/metadata/properties" xmlns:xsi="http://www.w3.org/2001/XMLSchema-instance" xmlns:pc="http://schemas.microsoft.com/office/infopath/2007/PartnerControls">
-  <documentManagement>
-    <TaxCatchAll xmlns="8e4e03e1-f8b1-44af-8a18-d6c17e30f4d4" xsi:nil="true"/>
-    <lcf76f155ced4ddcb4097134ff3c332f xmlns="e3f02ce4-f17e-46f8-88f7-72120ec08e56">
-      <Terms xmlns="http://schemas.microsoft.com/office/infopath/2007/PartnerControls"/>
-    </lcf76f155ced4ddcb4097134ff3c332f>
-  </documentManagement>
-</p:properties>
-</file>
-
 <file path=customXml/itemProps1.xml><?xml version="1.0" encoding="utf-8"?>
-<ds:datastoreItem xmlns:ds="http://schemas.openxmlformats.org/officeDocument/2006/customXml" ds:itemID="{B78916F7-E96D-45E4-BE19-7F82DE485B39}"/>
+<ds:datastoreItem xmlns:ds="http://schemas.openxmlformats.org/officeDocument/2006/customXml" ds:itemID="{BA5C0BC2-B71E-432D-B0A8-B4D26D587D54}">
+  <ds:schemaRefs>
+    <ds:schemaRef ds:uri="http://schemas.microsoft.com/office/2006/metadata/properties"/>
+    <ds:schemaRef ds:uri="http://schemas.microsoft.com/office/infopath/2007/PartnerControls"/>
+    <ds:schemaRef ds:uri="8e4e03e1-f8b1-44af-8a18-d6c17e30f4d4"/>
+    <ds:schemaRef ds:uri="e3f02ce4-f17e-46f8-88f7-72120ec08e56"/>
+  </ds:schemaRefs>
+</ds:datastoreItem>
 </file>
 
 <file path=customXml/itemProps2.xml><?xml version="1.0" encoding="utf-8"?>
-<ds:datastoreItem xmlns:ds="http://schemas.openxmlformats.org/officeDocument/2006/customXml" ds:itemID="{81401F57-51FD-4B84-9318-E17305442BE2}"/>
+<ds:datastoreItem xmlns:ds="http://schemas.openxmlformats.org/officeDocument/2006/customXml" ds:itemID="{81401F57-51FD-4B84-9318-E17305442BE2}">
+  <ds:schemaRefs>
+    <ds:schemaRef ds:uri="http://schemas.microsoft.com/sharepoint/v3/contenttype/forms"/>
+  </ds:schemaRefs>
+</ds:datastoreItem>
 </file>
 
 <file path=customXml/itemProps3.xml><?xml version="1.0" encoding="utf-8"?>
-<ds:datastoreItem xmlns:ds="http://schemas.openxmlformats.org/officeDocument/2006/customXml" ds:itemID="{BA5C0BC2-B71E-432D-B0A8-B4D26D587D54}"/>
+<ds:datastoreItem xmlns:ds="http://schemas.openxmlformats.org/officeDocument/2006/customXml" ds:itemID="{B78916F7-E96D-45E4-BE19-7F82DE485B39}">
+  <ds:schemaRefs>
+    <ds:schemaRef ds:uri="http://schemas.microsoft.com/office/2006/metadata/contentType"/>
+    <ds:schemaRef ds:uri="http://schemas.microsoft.com/office/2006/metadata/properties/metaAttributes"/>
+    <ds:schemaRef ds:uri="http://www.w3.org/2001/XMLSchema"/>
+    <ds:schemaRef ds:uri="http://schemas.microsoft.com/office/2006/metadata/properties"/>
+    <ds:schemaRef ds:uri="e3f02ce4-f17e-46f8-88f7-72120ec08e56"/>
+    <ds:schemaRef ds:uri="8e4e03e1-f8b1-44af-8a18-d6c17e30f4d4"/>
+    <ds:schemaRef ds:uri="http://schemas.microsoft.com/office/2006/documentManagement/types"/>
+    <ds:schemaRef ds:uri="http://schemas.microsoft.com/office/infopath/2007/PartnerControls"/>
+    <ds:schemaRef ds:uri="http://schemas.openxmlformats.org/package/2006/metadata/core-properties"/>
+    <ds:schemaRef ds:uri="http://purl.org/dc/elements/1.1/"/>
+    <ds:schemaRef ds:uri="http://purl.org/dc/terms/"/>
+    <ds:schemaRef ds:uri="http://schemas.microsoft.com/internal/obd"/>
+  </ds:schemaRefs>
+</ds:datastoreItem>
 </file>
</xml_diff>